<commit_message>
manque plus que les images
</commit_message>
<xml_diff>
--- a/Formation Git - basique.pptx
+++ b/Formation Git - basique.pptx
@@ -52,6 +52,12 @@
     <p:sldId id="301" r:id="rId46"/>
     <p:sldId id="302" r:id="rId47"/>
     <p:sldId id="303" r:id="rId48"/>
+    <p:sldId id="304" r:id="rId49"/>
+    <p:sldId id="305" r:id="rId50"/>
+    <p:sldId id="306" r:id="rId51"/>
+    <p:sldId id="307" r:id="rId52"/>
+    <p:sldId id="308" r:id="rId53"/>
+    <p:sldId id="309" r:id="rId54"/>
   </p:sldIdLst>
   <p:sldSz cx="12192000" cy="6858000"/>
   <p:notesSz cx="6858000" cy="9144000"/>
@@ -18950,8 +18956,13 @@
           <a:p>
             <a:r>
               <a:rPr lang="fr-CH" dirty="0"/>
-              <a:t>Pour créer une branche locale :</a:t>
-            </a:r>
+              <a:t>Pour créer une branche </a:t>
+            </a:r>
+            <a:r>
+              <a:rPr lang="fr-CH" dirty="0" smtClean="0"/>
+              <a:t>locale à partir de la branche courante:</a:t>
+            </a:r>
+            <a:endParaRPr lang="fr-CH" dirty="0"/>
           </a:p>
           <a:p>
             <a:pPr lvl="1"/>
@@ -18968,19 +18979,39 @@
               <a:t> </a:t>
             </a:r>
             <a:r>
+              <a:rPr lang="fr-CH" dirty="0" err="1" smtClean="0"/>
+              <a:t>mabranche</a:t>
+            </a:r>
+            <a:endParaRPr lang="fr-CH" dirty="0"/>
+          </a:p>
+          <a:p>
+            <a:r>
+              <a:rPr lang="fr-CH" dirty="0" smtClean="0"/>
+              <a:t>Passer </a:t>
+            </a:r>
+            <a:r>
+              <a:rPr lang="fr-CH" dirty="0"/>
+              <a:t>votre environnement de travail sur </a:t>
+            </a:r>
+            <a:r>
               <a:rPr lang="fr-CH" dirty="0" err="1"/>
               <a:t>mabranche</a:t>
             </a:r>
             <a:endParaRPr lang="fr-CH" dirty="0"/>
           </a:p>
           <a:p>
-            <a:r>
-              <a:rPr lang="fr-CH" dirty="0" smtClean="0"/>
-              <a:t>Passer </a:t>
+            <a:pPr lvl="1"/>
+            <a:r>
+              <a:rPr lang="fr-CH" dirty="0" smtClean="0"/>
+              <a:t>git </a:t>
+            </a:r>
+            <a:r>
+              <a:rPr lang="fr-CH" dirty="0" err="1"/>
+              <a:t>checkout</a:t>
             </a:r>
             <a:r>
               <a:rPr lang="fr-CH" dirty="0"/>
-              <a:t>votre environnement de travail sur </a:t>
+              <a:t> </a:t>
             </a:r>
             <a:r>
               <a:rPr lang="fr-CH" dirty="0" err="1"/>
@@ -18989,14 +19020,33 @@
             <a:endParaRPr lang="fr-CH" dirty="0"/>
           </a:p>
           <a:p>
+            <a:r>
+              <a:rPr lang="fr-CH" dirty="0" smtClean="0"/>
+              <a:t>On </a:t>
+            </a:r>
+            <a:r>
+              <a:rPr lang="fr-CH" dirty="0"/>
+              <a:t>fait des modifications, on commit etc. puis pousser sa branche en </a:t>
+            </a:r>
+            <a:r>
+              <a:rPr lang="fr-CH" dirty="0" err="1"/>
+              <a:t>remote</a:t>
+            </a:r>
+            <a:endParaRPr lang="fr-CH" dirty="0"/>
+          </a:p>
+          <a:p>
             <a:pPr lvl="1"/>
             <a:r>
               <a:rPr lang="fr-CH" dirty="0" smtClean="0"/>
               <a:t>git </a:t>
             </a:r>
             <a:r>
+              <a:rPr lang="fr-CH" dirty="0"/>
+              <a:t>push </a:t>
+            </a:r>
+            <a:r>
               <a:rPr lang="fr-CH" dirty="0" err="1"/>
-              <a:t>checkout</a:t>
+              <a:t>origin</a:t>
             </a:r>
             <a:r>
               <a:rPr lang="fr-CH" dirty="0"/>
@@ -19011,15 +19061,15 @@
           <a:p>
             <a:r>
               <a:rPr lang="fr-CH" dirty="0" smtClean="0"/>
-              <a:t>On </a:t>
+              <a:t>Administrer </a:t>
             </a:r>
             <a:r>
               <a:rPr lang="fr-CH" dirty="0"/>
-              <a:t>fait des modifications, on commit etc. puis pousser sa branche en </a:t>
-            </a:r>
-            <a:r>
-              <a:rPr lang="fr-CH" dirty="0" err="1"/>
-              <a:t>remote</a:t>
+              <a:t>ses </a:t>
+            </a:r>
+            <a:r>
+              <a:rPr lang="fr-CH" dirty="0" smtClean="0"/>
+              <a:t>branches</a:t>
             </a:r>
             <a:endParaRPr lang="fr-CH" dirty="0"/>
           </a:p>
@@ -19030,59 +19080,20 @@
               <a:t>git </a:t>
             </a:r>
             <a:r>
-              <a:rPr lang="fr-CH" dirty="0"/>
-              <a:t>push </a:t>
-            </a:r>
-            <a:r>
-              <a:rPr lang="fr-CH" dirty="0" err="1"/>
-              <a:t>origin</a:t>
+              <a:rPr lang="fr-CH" dirty="0" err="1" smtClean="0"/>
+              <a:t>branch</a:t>
             </a:r>
             <a:r>
               <a:rPr lang="fr-CH" dirty="0"/>
               <a:t> </a:t>
             </a:r>
             <a:r>
-              <a:rPr lang="fr-CH" dirty="0" err="1"/>
-              <a:t>mabranche</a:t>
-            </a:r>
-            <a:endParaRPr lang="fr-CH" dirty="0"/>
-          </a:p>
-          <a:p>
-            <a:r>
-              <a:rPr lang="fr-CH" dirty="0" smtClean="0"/>
-              <a:t>Administrer </a:t>
-            </a:r>
-            <a:r>
-              <a:rPr lang="fr-CH" dirty="0"/>
-              <a:t>ses </a:t>
-            </a:r>
-            <a:r>
-              <a:rPr lang="fr-CH" dirty="0" smtClean="0"/>
-              <a:t>branches</a:t>
-            </a:r>
-            <a:endParaRPr lang="fr-CH" dirty="0"/>
-          </a:p>
-          <a:p>
-            <a:pPr lvl="1"/>
-            <a:r>
-              <a:rPr lang="fr-CH" dirty="0" smtClean="0"/>
-              <a:t>git </a:t>
-            </a:r>
-            <a:r>
-              <a:rPr lang="fr-CH" dirty="0" err="1" smtClean="0"/>
-              <a:t>branch</a:t>
-            </a:r>
-            <a:r>
-              <a:rPr lang="fr-CH" dirty="0"/>
-              <a:t> </a:t>
-            </a:r>
-            <a:r>
               <a:rPr lang="fr-CH" dirty="0" smtClean="0"/>
               <a:t>-&gt; branches </a:t>
             </a:r>
             <a:r>
-              <a:rPr lang="fr-CH" dirty="0" err="1" smtClean="0"/>
-              <a:t>locals</a:t>
+              <a:rPr lang="fr-CH" dirty="0" smtClean="0"/>
+              <a:t>locales</a:t>
             </a:r>
             <a:endParaRPr lang="fr-CH" dirty="0"/>
           </a:p>
@@ -19117,12 +19128,20 @@
               <a:t> (pensez à </a:t>
             </a:r>
             <a:r>
-              <a:rPr lang="fr-CH" dirty="0" err="1"/>
+              <a:rPr lang="fr-CH" dirty="0" smtClean="0"/>
+              <a:t>faire </a:t>
+            </a:r>
+            <a:r>
+              <a:rPr lang="fr-CH" dirty="0" err="1" smtClean="0"/>
               <a:t>fetch</a:t>
             </a:r>
             <a:r>
+              <a:rPr lang="fr-CH" dirty="0" smtClean="0"/>
+              <a:t> </a:t>
+            </a:r>
+            <a:r>
               <a:rPr lang="fr-CH" dirty="0"/>
-              <a:t> avant</a:t>
+              <a:t>avant</a:t>
             </a:r>
             <a:r>
               <a:rPr lang="fr-CH" dirty="0" smtClean="0"/>
@@ -21102,14 +21121,10 @@
             </a:r>
             <a:r>
               <a:rPr lang="en-US" dirty="0"/>
-              <a:t>pull --rebase </a:t>
-            </a:r>
-            <a:r>
-              <a:rPr lang="en-US"/>
-              <a:t>origin </a:t>
-            </a:r>
-            <a:r>
-              <a:rPr lang="en-US" smtClean="0"/>
+              <a:t>pull --rebase origin </a:t>
+            </a:r>
+            <a:r>
+              <a:rPr lang="en-US" dirty="0" smtClean="0"/>
               <a:t>develop</a:t>
             </a:r>
             <a:endParaRPr lang="en-US" dirty="0"/>
@@ -21151,10 +21166,10 @@
               <a:t> </a:t>
             </a:r>
             <a:r>
-              <a:rPr lang="fr-CH" dirty="0" err="1"/>
+              <a:rPr lang="fr-CH" dirty="0" err="1" smtClean="0"/>
               <a:t>ma_branche</a:t>
             </a:r>
-            <a:endParaRPr lang="fr-CH" dirty="0"/>
+            <a:endParaRPr lang="fr-CH" dirty="0" smtClean="0"/>
           </a:p>
         </p:txBody>
       </p:sp>
@@ -21195,6 +21210,168 @@
 </p:sld>
 </file>
 
+<file path=ppt/slides/slide48.xml><?xml version="1.0" encoding="utf-8"?>
+<p:sld xmlns:a="http://schemas.openxmlformats.org/drawingml/2006/main" xmlns:r="http://schemas.openxmlformats.org/officeDocument/2006/relationships" xmlns:p="http://schemas.openxmlformats.org/presentationml/2006/main">
+  <p:cSld>
+    <p:spTree>
+      <p:nvGrpSpPr>
+        <p:cNvPr id="1" name=""/>
+        <p:cNvGrpSpPr/>
+        <p:nvPr/>
+      </p:nvGrpSpPr>
+      <p:grpSpPr>
+        <a:xfrm>
+          <a:off x="0" y="0"/>
+          <a:ext cx="0" cy="0"/>
+          <a:chOff x="0" y="0"/>
+          <a:chExt cx="0" cy="0"/>
+        </a:xfrm>
+      </p:grpSpPr>
+      <p:sp>
+        <p:nvSpPr>
+          <p:cNvPr id="2" name="Titre 1"/>
+          <p:cNvSpPr>
+            <a:spLocks noGrp="1"/>
+          </p:cNvSpPr>
+          <p:nvPr>
+            <p:ph type="title"/>
+          </p:nvPr>
+        </p:nvSpPr>
+        <p:spPr/>
+        <p:txBody>
+          <a:bodyPr/>
+          <a:lstStyle/>
+          <a:p>
+            <a:r>
+              <a:rPr lang="fr-CH" b="1" dirty="0"/>
+              <a:t>Comprendre le workflow de </a:t>
+            </a:r>
+            <a:r>
+              <a:rPr lang="fr-CH" b="1" dirty="0" err="1"/>
+              <a:t>GitFlow</a:t>
+            </a:r>
+            <a:endParaRPr lang="fr-CH" dirty="0"/>
+          </a:p>
+        </p:txBody>
+      </p:sp>
+      <p:pic>
+        <p:nvPicPr>
+          <p:cNvPr id="7" name="Espace réservé du contenu 6"/>
+          <p:cNvPicPr>
+            <a:picLocks noGrp="1" noChangeAspect="1"/>
+          </p:cNvPicPr>
+          <p:nvPr>
+            <p:ph idx="1"/>
+          </p:nvPr>
+        </p:nvPicPr>
+        <p:blipFill>
+          <a:blip r:embed="rId2">
+            <a:extLst>
+              <a:ext uri="{28A0092B-C50C-407E-A947-70E740481C1C}">
+                <a14:useLocalDpi xmlns:a14="http://schemas.microsoft.com/office/drawing/2010/main" val="0"/>
+              </a:ext>
+            </a:extLst>
+          </a:blip>
+          <a:stretch>
+            <a:fillRect/>
+          </a:stretch>
+        </p:blipFill>
+        <p:spPr>
+          <a:xfrm>
+            <a:off x="1872867" y="1181594"/>
+            <a:ext cx="8185534" cy="5023873"/>
+          </a:xfrm>
+        </p:spPr>
+      </p:pic>
+    </p:spTree>
+    <p:extLst>
+      <p:ext uri="{BB962C8B-B14F-4D97-AF65-F5344CB8AC3E}">
+        <p14:creationId xmlns:p14="http://schemas.microsoft.com/office/powerpoint/2010/main" val="3008056003"/>
+      </p:ext>
+    </p:extLst>
+  </p:cSld>
+  <p:clrMapOvr>
+    <a:masterClrMapping/>
+  </p:clrMapOvr>
+</p:sld>
+</file>
+
+<file path=ppt/slides/slide49.xml><?xml version="1.0" encoding="utf-8"?>
+<p:sld xmlns:a="http://schemas.openxmlformats.org/drawingml/2006/main" xmlns:r="http://schemas.openxmlformats.org/officeDocument/2006/relationships" xmlns:p="http://schemas.openxmlformats.org/presentationml/2006/main">
+  <p:cSld>
+    <p:spTree>
+      <p:nvGrpSpPr>
+        <p:cNvPr id="1" name=""/>
+        <p:cNvGrpSpPr/>
+        <p:nvPr/>
+      </p:nvGrpSpPr>
+      <p:grpSpPr>
+        <a:xfrm>
+          <a:off x="0" y="0"/>
+          <a:ext cx="0" cy="0"/>
+          <a:chOff x="0" y="0"/>
+          <a:chExt cx="0" cy="0"/>
+        </a:xfrm>
+      </p:grpSpPr>
+      <p:sp>
+        <p:nvSpPr>
+          <p:cNvPr id="2" name="Titre 1"/>
+          <p:cNvSpPr>
+            <a:spLocks noGrp="1"/>
+          </p:cNvSpPr>
+          <p:nvPr>
+            <p:ph type="title"/>
+          </p:nvPr>
+        </p:nvSpPr>
+        <p:spPr/>
+        <p:txBody>
+          <a:bodyPr/>
+          <a:lstStyle/>
+          <a:p>
+            <a:r>
+              <a:rPr lang="fr-FR" dirty="0" err="1" smtClean="0"/>
+              <a:t>Ré-écrire</a:t>
+            </a:r>
+            <a:r>
+              <a:rPr lang="fr-FR" dirty="0" smtClean="0"/>
+              <a:t> l’histoire</a:t>
+            </a:r>
+            <a:endParaRPr lang="fr-CH" dirty="0"/>
+          </a:p>
+        </p:txBody>
+      </p:sp>
+      <p:sp>
+        <p:nvSpPr>
+          <p:cNvPr id="3" name="Espace réservé du contenu 2"/>
+          <p:cNvSpPr>
+            <a:spLocks noGrp="1"/>
+          </p:cNvSpPr>
+          <p:nvPr>
+            <p:ph idx="1"/>
+          </p:nvPr>
+        </p:nvSpPr>
+        <p:spPr/>
+        <p:txBody>
+          <a:bodyPr/>
+          <a:lstStyle/>
+          <a:p>
+            <a:endParaRPr lang="fr-CH" dirty="0"/>
+          </a:p>
+        </p:txBody>
+      </p:sp>
+    </p:spTree>
+    <p:extLst>
+      <p:ext uri="{BB962C8B-B14F-4D97-AF65-F5344CB8AC3E}">
+        <p14:creationId xmlns:p14="http://schemas.microsoft.com/office/powerpoint/2010/main" val="4122106432"/>
+      </p:ext>
+    </p:extLst>
+  </p:cSld>
+  <p:clrMapOvr>
+    <a:masterClrMapping/>
+  </p:clrMapOvr>
+</p:sld>
+</file>
+
 <file path=ppt/slides/slide5.xml><?xml version="1.0" encoding="utf-8"?>
 <p:sld xmlns:a="http://schemas.openxmlformats.org/drawingml/2006/main" xmlns:r="http://schemas.openxmlformats.org/officeDocument/2006/relationships" xmlns:p="http://schemas.openxmlformats.org/presentationml/2006/main">
   <p:cSld>
@@ -21363,6 +21540,692 @@
       </p:par>
     </p:tnLst>
   </p:timing>
+</p:sld>
+</file>
+
+<file path=ppt/slides/slide50.xml><?xml version="1.0" encoding="utf-8"?>
+<p:sld xmlns:a="http://schemas.openxmlformats.org/drawingml/2006/main" xmlns:r="http://schemas.openxmlformats.org/officeDocument/2006/relationships" xmlns:p="http://schemas.openxmlformats.org/presentationml/2006/main">
+  <p:cSld>
+    <p:spTree>
+      <p:nvGrpSpPr>
+        <p:cNvPr id="1" name=""/>
+        <p:cNvGrpSpPr/>
+        <p:nvPr/>
+      </p:nvGrpSpPr>
+      <p:grpSpPr>
+        <a:xfrm>
+          <a:off x="0" y="0"/>
+          <a:ext cx="0" cy="0"/>
+          <a:chOff x="0" y="0"/>
+          <a:chExt cx="0" cy="0"/>
+        </a:xfrm>
+      </p:grpSpPr>
+      <p:sp>
+        <p:nvSpPr>
+          <p:cNvPr id="2" name="Titre 1"/>
+          <p:cNvSpPr>
+            <a:spLocks noGrp="1"/>
+          </p:cNvSpPr>
+          <p:nvPr>
+            <p:ph type="title"/>
+          </p:nvPr>
+        </p:nvSpPr>
+        <p:spPr/>
+        <p:txBody>
+          <a:bodyPr/>
+          <a:lstStyle/>
+          <a:p>
+            <a:r>
+              <a:rPr lang="fr-FR" dirty="0" err="1" smtClean="0"/>
+              <a:t>Amend</a:t>
+            </a:r>
+            <a:endParaRPr lang="fr-CH" dirty="0"/>
+          </a:p>
+        </p:txBody>
+      </p:sp>
+      <p:sp>
+        <p:nvSpPr>
+          <p:cNvPr id="10" name="Espace réservé du contenu 9"/>
+          <p:cNvSpPr>
+            <a:spLocks noGrp="1"/>
+          </p:cNvSpPr>
+          <p:nvPr>
+            <p:ph idx="1"/>
+          </p:nvPr>
+        </p:nvSpPr>
+        <p:spPr/>
+        <p:txBody>
+          <a:bodyPr/>
+          <a:lstStyle/>
+          <a:p>
+            <a:r>
+              <a:rPr lang="fr-FR" dirty="0" smtClean="0"/>
+              <a:t>Permet  « d’amender » le dernier commit afin de</a:t>
+            </a:r>
+          </a:p>
+          <a:p>
+            <a:pPr lvl="1"/>
+            <a:r>
+              <a:rPr lang="fr-FR" dirty="0" smtClean="0"/>
+              <a:t>Modifier le message du commit</a:t>
+            </a:r>
+          </a:p>
+          <a:p>
+            <a:pPr lvl="1"/>
+            <a:r>
+              <a:rPr lang="fr-FR" dirty="0" smtClean="0"/>
+              <a:t>Modifier le contenu du commit</a:t>
+            </a:r>
+          </a:p>
+          <a:p>
+            <a:pPr lvl="1"/>
+            <a:endParaRPr lang="fr-FR" dirty="0"/>
+          </a:p>
+          <a:p>
+            <a:r>
+              <a:rPr lang="fr-FR" dirty="0" smtClean="0"/>
+              <a:t>Exercice</a:t>
+            </a:r>
+          </a:p>
+          <a:p>
+            <a:pPr lvl="1"/>
+            <a:r>
+              <a:rPr lang="fr-FR" dirty="0" smtClean="0"/>
+              <a:t>Se placez dans un repo existant</a:t>
+            </a:r>
+          </a:p>
+          <a:p>
+            <a:pPr lvl="1"/>
+            <a:r>
+              <a:rPr lang="fr-FR" dirty="0" smtClean="0"/>
+              <a:t>Modifiez un fichier</a:t>
+            </a:r>
+          </a:p>
+          <a:p>
+            <a:pPr lvl="1"/>
+            <a:r>
+              <a:rPr lang="fr-FR" dirty="0" smtClean="0"/>
+              <a:t>Ajoutez ce fichier au dernier commit</a:t>
+            </a:r>
+            <a:endParaRPr lang="fr-CH" dirty="0"/>
+          </a:p>
+        </p:txBody>
+      </p:sp>
+      <p:pic>
+        <p:nvPicPr>
+          <p:cNvPr id="11" name="Image 10"/>
+          <p:cNvPicPr>
+            <a:picLocks noChangeAspect="1"/>
+          </p:cNvPicPr>
+          <p:nvPr/>
+        </p:nvPicPr>
+        <p:blipFill>
+          <a:blip r:embed="rId2">
+            <a:extLst>
+              <a:ext uri="{28A0092B-C50C-407E-A947-70E740481C1C}">
+                <a14:useLocalDpi xmlns:a14="http://schemas.microsoft.com/office/drawing/2010/main" val="0"/>
+              </a:ext>
+            </a:extLst>
+          </a:blip>
+          <a:stretch>
+            <a:fillRect/>
+          </a:stretch>
+        </p:blipFill>
+        <p:spPr>
+          <a:xfrm>
+            <a:off x="7892954" y="1808716"/>
+            <a:ext cx="2584087" cy="3214039"/>
+          </a:xfrm>
+          <a:prstGeom prst="rect">
+            <a:avLst/>
+          </a:prstGeom>
+        </p:spPr>
+      </p:pic>
+    </p:spTree>
+    <p:extLst>
+      <p:ext uri="{BB962C8B-B14F-4D97-AF65-F5344CB8AC3E}">
+        <p14:creationId xmlns:p14="http://schemas.microsoft.com/office/powerpoint/2010/main" val="89987842"/>
+      </p:ext>
+    </p:extLst>
+  </p:cSld>
+  <p:clrMapOvr>
+    <a:masterClrMapping/>
+  </p:clrMapOvr>
+</p:sld>
+</file>
+
+<file path=ppt/slides/slide51.xml><?xml version="1.0" encoding="utf-8"?>
+<p:sld xmlns:a="http://schemas.openxmlformats.org/drawingml/2006/main" xmlns:r="http://schemas.openxmlformats.org/officeDocument/2006/relationships" xmlns:p="http://schemas.openxmlformats.org/presentationml/2006/main">
+  <p:cSld>
+    <p:spTree>
+      <p:nvGrpSpPr>
+        <p:cNvPr id="1" name=""/>
+        <p:cNvGrpSpPr/>
+        <p:nvPr/>
+      </p:nvGrpSpPr>
+      <p:grpSpPr>
+        <a:xfrm>
+          <a:off x="0" y="0"/>
+          <a:ext cx="0" cy="0"/>
+          <a:chOff x="0" y="0"/>
+          <a:chExt cx="0" cy="0"/>
+        </a:xfrm>
+      </p:grpSpPr>
+      <p:sp>
+        <p:nvSpPr>
+          <p:cNvPr id="2" name="Titre 1"/>
+          <p:cNvSpPr>
+            <a:spLocks noGrp="1"/>
+          </p:cNvSpPr>
+          <p:nvPr>
+            <p:ph type="title"/>
+          </p:nvPr>
+        </p:nvSpPr>
+        <p:spPr/>
+        <p:txBody>
+          <a:bodyPr/>
+          <a:lstStyle/>
+          <a:p>
+            <a:r>
+              <a:rPr lang="fr-FR" dirty="0" err="1" smtClean="0"/>
+              <a:t>Rebase</a:t>
+            </a:r>
+            <a:r>
+              <a:rPr lang="fr-FR" dirty="0" smtClean="0"/>
+              <a:t> interactif</a:t>
+            </a:r>
+            <a:endParaRPr lang="fr-CH" dirty="0"/>
+          </a:p>
+        </p:txBody>
+      </p:sp>
+      <p:sp>
+        <p:nvSpPr>
+          <p:cNvPr id="3" name="Espace réservé du contenu 2"/>
+          <p:cNvSpPr>
+            <a:spLocks noGrp="1"/>
+          </p:cNvSpPr>
+          <p:nvPr>
+            <p:ph idx="1"/>
+          </p:nvPr>
+        </p:nvSpPr>
+        <p:spPr>
+          <a:xfrm>
+            <a:off x="950384" y="1951038"/>
+            <a:ext cx="10281992" cy="4218408"/>
+          </a:xfrm>
+        </p:spPr>
+        <p:txBody>
+          <a:bodyPr>
+            <a:normAutofit lnSpcReduction="10000"/>
+          </a:bodyPr>
+          <a:lstStyle/>
+          <a:p>
+            <a:r>
+              <a:rPr lang="fr-FR" dirty="0" smtClean="0"/>
+              <a:t>Réordonner les </a:t>
+            </a:r>
+            <a:r>
+              <a:rPr lang="fr-FR" dirty="0" err="1" smtClean="0"/>
+              <a:t>commits</a:t>
+            </a:r>
+            <a:endParaRPr lang="fr-FR" dirty="0" smtClean="0"/>
+          </a:p>
+          <a:p>
+            <a:r>
+              <a:rPr lang="fr-FR" dirty="0" smtClean="0"/>
+              <a:t>Fusionner des </a:t>
+            </a:r>
+            <a:r>
+              <a:rPr lang="fr-FR" dirty="0" err="1" smtClean="0"/>
+              <a:t>commits</a:t>
+            </a:r>
+            <a:endParaRPr lang="fr-FR" dirty="0" smtClean="0"/>
+          </a:p>
+          <a:p>
+            <a:r>
+              <a:rPr lang="fr-FR" dirty="0" smtClean="0"/>
+              <a:t>Modifier les messages des </a:t>
+            </a:r>
+            <a:r>
+              <a:rPr lang="fr-FR" dirty="0" err="1" smtClean="0"/>
+              <a:t>commits</a:t>
+            </a:r>
+            <a:endParaRPr lang="fr-FR" dirty="0" smtClean="0"/>
+          </a:p>
+          <a:p>
+            <a:r>
+              <a:rPr lang="fr-FR" dirty="0" smtClean="0"/>
+              <a:t>Supprimer des </a:t>
+            </a:r>
+            <a:r>
+              <a:rPr lang="fr-FR" dirty="0" err="1" smtClean="0"/>
+              <a:t>commits</a:t>
+            </a:r>
+            <a:endParaRPr lang="fr-FR" dirty="0" smtClean="0"/>
+          </a:p>
+          <a:p>
+            <a:endParaRPr lang="fr-FR" dirty="0"/>
+          </a:p>
+          <a:p>
+            <a:endParaRPr lang="fr-FR" dirty="0" smtClean="0"/>
+          </a:p>
+          <a:p>
+            <a:r>
+              <a:rPr lang="fr-FR" dirty="0" smtClean="0"/>
+              <a:t>Exercice</a:t>
+            </a:r>
+          </a:p>
+          <a:p>
+            <a:pPr lvl="1"/>
+            <a:r>
+              <a:rPr lang="fr-FR" dirty="0" smtClean="0"/>
+              <a:t>Se placez dans un repo existant </a:t>
+            </a:r>
+          </a:p>
+          <a:p>
+            <a:pPr lvl="1"/>
+            <a:r>
+              <a:rPr lang="fr-FR" dirty="0" smtClean="0"/>
+              <a:t>Fusionnez les 2 derniers </a:t>
+            </a:r>
+            <a:r>
+              <a:rPr lang="fr-FR" dirty="0" err="1" smtClean="0"/>
+              <a:t>commits</a:t>
+            </a:r>
+            <a:endParaRPr lang="fr-FR" dirty="0" smtClean="0"/>
+          </a:p>
+          <a:p>
+            <a:pPr lvl="2"/>
+            <a:r>
+              <a:rPr lang="fr-FR" dirty="0"/>
+              <a:t>g</a:t>
+            </a:r>
+            <a:r>
+              <a:rPr lang="fr-FR" dirty="0" smtClean="0"/>
+              <a:t>it </a:t>
+            </a:r>
+            <a:r>
+              <a:rPr lang="fr-FR" dirty="0" err="1" smtClean="0"/>
+              <a:t>rebase</a:t>
+            </a:r>
+            <a:r>
+              <a:rPr lang="fr-FR" dirty="0" smtClean="0"/>
+              <a:t> –i &lt;</a:t>
+            </a:r>
+            <a:r>
+              <a:rPr lang="fr-FR" dirty="0" err="1" smtClean="0"/>
+              <a:t>shorthash</a:t>
+            </a:r>
+            <a:r>
+              <a:rPr lang="fr-FR" dirty="0" smtClean="0"/>
+              <a:t>&gt;</a:t>
+            </a:r>
+            <a:endParaRPr lang="fr-CH" dirty="0"/>
+          </a:p>
+        </p:txBody>
+      </p:sp>
+      <p:pic>
+        <p:nvPicPr>
+          <p:cNvPr id="5" name="Image 4"/>
+          <p:cNvPicPr>
+            <a:picLocks noChangeAspect="1"/>
+          </p:cNvPicPr>
+          <p:nvPr/>
+        </p:nvPicPr>
+        <p:blipFill>
+          <a:blip r:embed="rId2">
+            <a:extLst>
+              <a:ext uri="{28A0092B-C50C-407E-A947-70E740481C1C}">
+                <a14:useLocalDpi xmlns:a14="http://schemas.microsoft.com/office/drawing/2010/main" val="0"/>
+              </a:ext>
+            </a:extLst>
+          </a:blip>
+          <a:stretch>
+            <a:fillRect/>
+          </a:stretch>
+        </p:blipFill>
+        <p:spPr>
+          <a:xfrm>
+            <a:off x="6215842" y="1690233"/>
+            <a:ext cx="4509758" cy="3900941"/>
+          </a:xfrm>
+          <a:prstGeom prst="rect">
+            <a:avLst/>
+          </a:prstGeom>
+        </p:spPr>
+      </p:pic>
+    </p:spTree>
+    <p:extLst>
+      <p:ext uri="{BB962C8B-B14F-4D97-AF65-F5344CB8AC3E}">
+        <p14:creationId xmlns:p14="http://schemas.microsoft.com/office/powerpoint/2010/main" val="3545655747"/>
+      </p:ext>
+    </p:extLst>
+  </p:cSld>
+  <p:clrMapOvr>
+    <a:masterClrMapping/>
+  </p:clrMapOvr>
+</p:sld>
+</file>
+
+<file path=ppt/slides/slide52.xml><?xml version="1.0" encoding="utf-8"?>
+<p:sld xmlns:a="http://schemas.openxmlformats.org/drawingml/2006/main" xmlns:r="http://schemas.openxmlformats.org/officeDocument/2006/relationships" xmlns:p="http://schemas.openxmlformats.org/presentationml/2006/main">
+  <p:cSld>
+    <p:spTree>
+      <p:nvGrpSpPr>
+        <p:cNvPr id="1" name=""/>
+        <p:cNvGrpSpPr/>
+        <p:nvPr/>
+      </p:nvGrpSpPr>
+      <p:grpSpPr>
+        <a:xfrm>
+          <a:off x="0" y="0"/>
+          <a:ext cx="0" cy="0"/>
+          <a:chOff x="0" y="0"/>
+          <a:chExt cx="0" cy="0"/>
+        </a:xfrm>
+      </p:grpSpPr>
+      <p:sp>
+        <p:nvSpPr>
+          <p:cNvPr id="2" name="Titre 1"/>
+          <p:cNvSpPr>
+            <a:spLocks noGrp="1"/>
+          </p:cNvSpPr>
+          <p:nvPr>
+            <p:ph type="title"/>
+          </p:nvPr>
+        </p:nvSpPr>
+        <p:spPr/>
+        <p:txBody>
+          <a:bodyPr/>
+          <a:lstStyle/>
+          <a:p>
+            <a:r>
+              <a:rPr lang="fr-FR" dirty="0" err="1" smtClean="0"/>
+              <a:t>Reflog</a:t>
+            </a:r>
+            <a:endParaRPr lang="fr-CH" dirty="0"/>
+          </a:p>
+        </p:txBody>
+      </p:sp>
+      <p:sp>
+        <p:nvSpPr>
+          <p:cNvPr id="3" name="Espace réservé du contenu 2"/>
+          <p:cNvSpPr>
+            <a:spLocks noGrp="1"/>
+          </p:cNvSpPr>
+          <p:nvPr>
+            <p:ph idx="1"/>
+          </p:nvPr>
+        </p:nvSpPr>
+        <p:spPr/>
+        <p:txBody>
+          <a:bodyPr>
+            <a:normAutofit/>
+          </a:bodyPr>
+          <a:lstStyle/>
+          <a:p>
+            <a:r>
+              <a:rPr lang="fr-FR" dirty="0" smtClean="0"/>
+              <a:t>Afficher toutes les opérations faites dans le repo</a:t>
+            </a:r>
+          </a:p>
+          <a:p>
+            <a:pPr lvl="1"/>
+            <a:r>
+              <a:rPr lang="fr-FR" dirty="0"/>
+              <a:t>g</a:t>
+            </a:r>
+            <a:r>
+              <a:rPr lang="fr-FR" dirty="0" smtClean="0"/>
+              <a:t>it </a:t>
+            </a:r>
+            <a:r>
+              <a:rPr lang="fr-FR" dirty="0" err="1" smtClean="0"/>
+              <a:t>reflog</a:t>
+            </a:r>
+            <a:endParaRPr lang="fr-FR" dirty="0"/>
+          </a:p>
+          <a:p>
+            <a:r>
+              <a:rPr lang="fr-FR" dirty="0" smtClean="0"/>
+              <a:t>Annuler une opération</a:t>
+            </a:r>
+          </a:p>
+          <a:p>
+            <a:pPr lvl="1"/>
+            <a:r>
+              <a:rPr lang="fr-FR" dirty="0" smtClean="0"/>
+              <a:t>git reset –hard &lt;</a:t>
+            </a:r>
+            <a:r>
+              <a:rPr lang="fr-FR" dirty="0" err="1" smtClean="0"/>
+              <a:t>shorthash</a:t>
+            </a:r>
+            <a:r>
+              <a:rPr lang="fr-FR" dirty="0" smtClean="0"/>
+              <a:t>&gt;</a:t>
+            </a:r>
+          </a:p>
+          <a:p>
+            <a:r>
+              <a:rPr lang="fr-FR" dirty="0" smtClean="0"/>
+              <a:t>Exercice </a:t>
+            </a:r>
+          </a:p>
+          <a:p>
+            <a:pPr lvl="1"/>
+            <a:r>
+              <a:rPr lang="fr-FR" dirty="0" smtClean="0"/>
+              <a:t>Reprendre le repo précédent </a:t>
+            </a:r>
+          </a:p>
+          <a:p>
+            <a:pPr lvl="1"/>
+            <a:r>
+              <a:rPr lang="fr-FR" dirty="0" smtClean="0"/>
+              <a:t>Revenir à l’état avant le </a:t>
+            </a:r>
+            <a:r>
+              <a:rPr lang="fr-FR" dirty="0" err="1" smtClean="0"/>
+              <a:t>rebase</a:t>
+            </a:r>
+            <a:r>
+              <a:rPr lang="fr-FR" dirty="0" smtClean="0"/>
+              <a:t> interactif </a:t>
+            </a:r>
+          </a:p>
+          <a:p>
+            <a:pPr marL="361950" lvl="1" indent="0">
+              <a:buNone/>
+            </a:pPr>
+            <a:endParaRPr lang="fr-FR" dirty="0"/>
+          </a:p>
+          <a:p>
+            <a:pPr marL="80962" indent="0">
+              <a:buNone/>
+            </a:pPr>
+            <a:endParaRPr lang="fr-CH" dirty="0"/>
+          </a:p>
+        </p:txBody>
+      </p:sp>
+      <p:pic>
+        <p:nvPicPr>
+          <p:cNvPr id="6" name="Image 5"/>
+          <p:cNvPicPr>
+            <a:picLocks noChangeAspect="1"/>
+          </p:cNvPicPr>
+          <p:nvPr/>
+        </p:nvPicPr>
+        <p:blipFill>
+          <a:blip r:embed="rId2"/>
+          <a:stretch>
+            <a:fillRect/>
+          </a:stretch>
+        </p:blipFill>
+        <p:spPr>
+          <a:xfrm>
+            <a:off x="4663463" y="2317616"/>
+            <a:ext cx="7029450" cy="790575"/>
+          </a:xfrm>
+          <a:prstGeom prst="rect">
+            <a:avLst/>
+          </a:prstGeom>
+        </p:spPr>
+      </p:pic>
+    </p:spTree>
+    <p:extLst>
+      <p:ext uri="{BB962C8B-B14F-4D97-AF65-F5344CB8AC3E}">
+        <p14:creationId xmlns:p14="http://schemas.microsoft.com/office/powerpoint/2010/main" val="4070964728"/>
+      </p:ext>
+    </p:extLst>
+  </p:cSld>
+  <p:clrMapOvr>
+    <a:masterClrMapping/>
+  </p:clrMapOvr>
+</p:sld>
+</file>
+
+<file path=ppt/slides/slide53.xml><?xml version="1.0" encoding="utf-8"?>
+<p:sld xmlns:a="http://schemas.openxmlformats.org/drawingml/2006/main" xmlns:r="http://schemas.openxmlformats.org/officeDocument/2006/relationships" xmlns:p="http://schemas.openxmlformats.org/presentationml/2006/main">
+  <p:cSld>
+    <p:spTree>
+      <p:nvGrpSpPr>
+        <p:cNvPr id="1" name=""/>
+        <p:cNvGrpSpPr/>
+        <p:nvPr/>
+      </p:nvGrpSpPr>
+      <p:grpSpPr>
+        <a:xfrm>
+          <a:off x="0" y="0"/>
+          <a:ext cx="0" cy="0"/>
+          <a:chOff x="0" y="0"/>
+          <a:chExt cx="0" cy="0"/>
+        </a:xfrm>
+      </p:grpSpPr>
+      <p:sp>
+        <p:nvSpPr>
+          <p:cNvPr id="2" name="Titre 1"/>
+          <p:cNvSpPr>
+            <a:spLocks noGrp="1"/>
+          </p:cNvSpPr>
+          <p:nvPr>
+            <p:ph type="title"/>
+          </p:nvPr>
+        </p:nvSpPr>
+        <p:spPr/>
+        <p:txBody>
+          <a:bodyPr/>
+          <a:lstStyle/>
+          <a:p>
+            <a:r>
+              <a:rPr lang="fr-FR" dirty="0" smtClean="0"/>
+              <a:t>Questions?</a:t>
+            </a:r>
+            <a:endParaRPr lang="fr-CH" dirty="0"/>
+          </a:p>
+        </p:txBody>
+      </p:sp>
+      <p:sp>
+        <p:nvSpPr>
+          <p:cNvPr id="3" name="Espace réservé du contenu 2"/>
+          <p:cNvSpPr>
+            <a:spLocks noGrp="1"/>
+          </p:cNvSpPr>
+          <p:nvPr>
+            <p:ph idx="1"/>
+          </p:nvPr>
+        </p:nvSpPr>
+        <p:spPr/>
+        <p:txBody>
+          <a:bodyPr/>
+          <a:lstStyle/>
+          <a:p>
+            <a:endParaRPr lang="fr-CH"/>
+          </a:p>
+        </p:txBody>
+      </p:sp>
+      <p:sp>
+        <p:nvSpPr>
+          <p:cNvPr id="4" name="Espace réservé du pied de page 3"/>
+          <p:cNvSpPr>
+            <a:spLocks noGrp="1"/>
+          </p:cNvSpPr>
+          <p:nvPr>
+            <p:ph type="ftr" sz="quarter" idx="11"/>
+          </p:nvPr>
+        </p:nvSpPr>
+        <p:spPr/>
+        <p:txBody>
+          <a:bodyPr/>
+          <a:lstStyle/>
+          <a:p>
+            <a:pPr algn="l" defTabSz="914400" eaLnBrk="0" fontAlgn="base" hangingPunct="0">
+              <a:spcBef>
+                <a:spcPct val="0"/>
+              </a:spcBef>
+              <a:spcAft>
+                <a:spcPct val="0"/>
+              </a:spcAft>
+            </a:pPr>
+            <a:r>
+              <a:rPr lang="fr-CH" b="1" smtClean="0">
+                <a:solidFill>
+                  <a:srgbClr val="000000"/>
+                </a:solidFill>
+                <a:latin typeface="HelveticaNeueLT Com 65 Md" charset="0"/>
+                <a:ea typeface="MS PGothic" charset="0"/>
+                <a:cs typeface="MS PGothic" charset="0"/>
+              </a:rPr>
+              <a:t>Titre de la présentation, HelveticaNeueLT 65, 10pts, gras</a:t>
+            </a:r>
+          </a:p>
+          <a:p>
+            <a:pPr algn="l" defTabSz="914400" eaLnBrk="0" fontAlgn="base" hangingPunct="0">
+              <a:spcBef>
+                <a:spcPct val="0"/>
+              </a:spcBef>
+              <a:spcAft>
+                <a:spcPct val="0"/>
+              </a:spcAft>
+            </a:pPr>
+            <a:r>
+              <a:rPr lang="fr-CH" smtClean="0">
+                <a:solidFill>
+                  <a:schemeClr val="tx1">
+                    <a:lumMod val="50000"/>
+                    <a:lumOff val="50000"/>
+                  </a:schemeClr>
+                </a:solidFill>
+                <a:latin typeface="HelveticaNeueLT Std Med"/>
+                <a:ea typeface="MS PGothic" charset="0"/>
+                <a:cs typeface="HelveticaNeueLT Std Med"/>
+              </a:rPr>
+              <a:t>Complément au titre HelveticaNeueLT 65, 10pts</a:t>
+            </a:r>
+            <a:endParaRPr lang="fr-CH" dirty="0" smtClean="0">
+              <a:solidFill>
+                <a:schemeClr val="tx1">
+                  <a:lumMod val="50000"/>
+                  <a:lumOff val="50000"/>
+                </a:schemeClr>
+              </a:solidFill>
+              <a:latin typeface="HelveticaNeueLT Std Med"/>
+              <a:ea typeface="MS PGothic" charset="0"/>
+              <a:cs typeface="HelveticaNeueLT Std Med"/>
+            </a:endParaRPr>
+          </a:p>
+        </p:txBody>
+      </p:sp>
+    </p:spTree>
+    <p:extLst>
+      <p:ext uri="{BB962C8B-B14F-4D97-AF65-F5344CB8AC3E}">
+        <p14:creationId xmlns:p14="http://schemas.microsoft.com/office/powerpoint/2010/main" val="262972144"/>
+      </p:ext>
+    </p:extLst>
+  </p:cSld>
+  <p:clrMapOvr>
+    <a:masterClrMapping/>
+  </p:clrMapOvr>
 </p:sld>
 </file>
 

</xml_diff>